<commit_message>
TK-330278 - Review What's new doc
</commit_message>
<xml_diff>
--- a/docs/presentations/Sage300SDK_2021_2WebSDKOverview.pptx
+++ b/docs/presentations/Sage300SDK_2021_2WebSDKOverview.pptx
@@ -4282,7 +4282,7 @@
         </p:nvSpPr>
         <p:spPr>
           <a:xfrm>
-            <a:off x="526702" y="2209800"/>
+            <a:off x="526702" y="2025650"/>
             <a:ext cx="5600113" cy="4013198"/>
           </a:xfrm>
         </p:spPr>
@@ -4307,7 +4307,7 @@
             <a:pPr lvl="1"/>
             <a:r>
               <a:rPr lang="en-GB" dirty="0"/>
-              <a:t>No longer allows only if Import, Export, etc. security is in place</a:t>
+              <a:t>No longer allowed only if Import, Export, etc. security is in place</a:t>
             </a:r>
           </a:p>
           <a:p>
@@ -4335,7 +4335,7 @@
             <a:pPr lvl="1"/>
             <a:r>
               <a:rPr lang="en-GB" dirty="0"/>
-              <a:t>Note: disable method coming in August</a:t>
+              <a:t>Note: enable/disable methods coming in August</a:t>
             </a:r>
           </a:p>
         </p:txBody>
@@ -4431,7 +4431,7 @@
         </p:blipFill>
         <p:spPr>
           <a:xfrm>
-            <a:off x="6340353" y="1983082"/>
+            <a:off x="6340353" y="1798932"/>
             <a:ext cx="5600114" cy="4152465"/>
           </a:xfrm>
           <a:prstGeom prst="rect">
@@ -4619,12 +4619,19 @@
         </p:blipFill>
         <p:spPr>
           <a:xfrm>
-            <a:off x="6501221" y="2209060"/>
-            <a:ext cx="4930082" cy="1492188"/>
+            <a:off x="6126815" y="1663700"/>
+            <a:ext cx="5360335" cy="2037548"/>
           </a:xfrm>
           <a:prstGeom prst="rect">
             <a:avLst/>
           </a:prstGeom>
+          <a:ln>
+            <a:solidFill>
+              <a:schemeClr val="bg1">
+                <a:lumMod val="85000"/>
+              </a:schemeClr>
+            </a:solidFill>
+          </a:ln>
         </p:spPr>
       </p:pic>
       <p:pic>
@@ -4812,19 +4819,45 @@
           <p:nvPr/>
         </p:nvPicPr>
         <p:blipFill>
-          <a:blip r:embed="rId2"/>
+          <a:blip r:embed="rId2">
+            <a:extLst>
+              <a:ext uri="{BEBA8EAE-BF5A-486C-A8C5-ECC9F3942E4B}">
+                <a14:imgProps xmlns:a14="http://schemas.microsoft.com/office/drawing/2010/main">
+                  <a14:imgLayer r:embed="rId3">
+                    <a14:imgEffect>
+                      <a14:saturation sat="120000"/>
+                    </a14:imgEffect>
+                  </a14:imgLayer>
+                </a14:imgProps>
+              </a:ext>
+            </a:extLst>
+          </a:blip>
           <a:stretch>
             <a:fillRect/>
           </a:stretch>
         </p:blipFill>
         <p:spPr>
           <a:xfrm>
-            <a:off x="6232656" y="1088993"/>
-            <a:ext cx="5548930" cy="5210263"/>
+            <a:off x="5942014" y="1102286"/>
+            <a:ext cx="5839572" cy="5196970"/>
           </a:xfrm>
           <a:prstGeom prst="rect">
             <a:avLst/>
           </a:prstGeom>
+          <a:ln>
+            <a:solidFill>
+              <a:schemeClr val="bg1">
+                <a:lumMod val="85000"/>
+              </a:schemeClr>
+            </a:solidFill>
+          </a:ln>
+          <a:effectLst>
+            <a:outerShdw blurRad="50800" dist="38100" dir="2700000" algn="tl" rotWithShape="0">
+              <a:prstClr val="black">
+                <a:alpha val="11000"/>
+              </a:prstClr>
+            </a:outerShdw>
+          </a:effectLst>
         </p:spPr>
       </p:pic>
     </p:spTree>
@@ -5021,6 +5054,20 @@
           <a:prstGeom prst="rect">
             <a:avLst/>
           </a:prstGeom>
+          <a:ln>
+            <a:solidFill>
+              <a:schemeClr val="bg1">
+                <a:lumMod val="85000"/>
+              </a:schemeClr>
+            </a:solidFill>
+          </a:ln>
+          <a:effectLst>
+            <a:outerShdw blurRad="50800" dist="38100" dir="2700000" algn="tl" rotWithShape="0">
+              <a:prstClr val="black">
+                <a:alpha val="13000"/>
+              </a:prstClr>
+            </a:outerShdw>
+          </a:effectLst>
         </p:spPr>
       </p:pic>
     </p:spTree>
@@ -5400,12 +5447,19 @@
         </p:blipFill>
         <p:spPr>
           <a:xfrm>
-            <a:off x="5379868" y="1900237"/>
-            <a:ext cx="6645542" cy="4198722"/>
+            <a:off x="5415779" y="2209800"/>
+            <a:ext cx="6469849" cy="1919562"/>
           </a:xfrm>
           <a:prstGeom prst="rect">
             <a:avLst/>
           </a:prstGeom>
+          <a:effectLst>
+            <a:outerShdw blurRad="50800" dist="38100" dir="2700000" algn="tl" rotWithShape="0">
+              <a:prstClr val="black">
+                <a:alpha val="40000"/>
+              </a:prstClr>
+            </a:outerShdw>
+          </a:effectLst>
         </p:spPr>
       </p:pic>
     </p:spTree>
@@ -6081,6 +6135,20 @@
           <a:prstGeom prst="rect">
             <a:avLst/>
           </a:prstGeom>
+          <a:ln>
+            <a:solidFill>
+              <a:schemeClr val="bg1">
+                <a:lumMod val="85000"/>
+              </a:schemeClr>
+            </a:solidFill>
+          </a:ln>
+          <a:effectLst>
+            <a:outerShdw blurRad="50800" dist="38100" dir="2700000" algn="tl" rotWithShape="0">
+              <a:prstClr val="black">
+                <a:alpha val="40000"/>
+              </a:prstClr>
+            </a:outerShdw>
+          </a:effectLst>
         </p:spPr>
       </p:pic>
       <p:sp>
@@ -6583,12 +6651,26 @@
         </p:blipFill>
         <p:spPr>
           <a:xfrm>
-            <a:off x="5304531" y="2018226"/>
-            <a:ext cx="6706956" cy="4204772"/>
+            <a:off x="5536721" y="2018226"/>
+            <a:ext cx="6244865" cy="4204772"/>
           </a:xfrm>
           <a:prstGeom prst="rect">
             <a:avLst/>
           </a:prstGeom>
+          <a:ln>
+            <a:solidFill>
+              <a:schemeClr val="bg1">
+                <a:lumMod val="85000"/>
+              </a:schemeClr>
+            </a:solidFill>
+          </a:ln>
+          <a:effectLst>
+            <a:outerShdw blurRad="50800" dist="38100" dir="2700000" algn="tl" rotWithShape="0">
+              <a:prstClr val="black">
+                <a:alpha val="13000"/>
+              </a:prstClr>
+            </a:outerShdw>
+          </a:effectLst>
         </p:spPr>
       </p:pic>
     </p:spTree>
@@ -6772,6 +6854,13 @@
           <a:prstGeom prst="rect">
             <a:avLst/>
           </a:prstGeom>
+          <a:effectLst>
+            <a:outerShdw blurRad="50800" dist="38100" dir="2700000" algn="tl" rotWithShape="0">
+              <a:prstClr val="black">
+                <a:alpha val="13000"/>
+              </a:prstClr>
+            </a:outerShdw>
+          </a:effectLst>
         </p:spPr>
       </p:pic>
     </p:spTree>
@@ -6969,6 +7058,20 @@
           <a:prstGeom prst="rect">
             <a:avLst/>
           </a:prstGeom>
+          <a:ln>
+            <a:solidFill>
+              <a:schemeClr val="bg1">
+                <a:lumMod val="85000"/>
+              </a:schemeClr>
+            </a:solidFill>
+          </a:ln>
+          <a:effectLst>
+            <a:outerShdw blurRad="50800" dist="38100" dir="2700000" algn="tl" rotWithShape="0">
+              <a:prstClr val="black">
+                <a:alpha val="13000"/>
+              </a:prstClr>
+            </a:outerShdw>
+          </a:effectLst>
         </p:spPr>
       </p:pic>
     </p:spTree>
@@ -7152,6 +7255,13 @@
           <a:prstGeom prst="rect">
             <a:avLst/>
           </a:prstGeom>
+          <a:effectLst>
+            <a:outerShdw blurRad="50800" dist="38100" dir="2700000" algn="tl" rotWithShape="0">
+              <a:prstClr val="black">
+                <a:alpha val="35000"/>
+              </a:prstClr>
+            </a:outerShdw>
+          </a:effectLst>
         </p:spPr>
       </p:pic>
     </p:spTree>
@@ -7991,7 +8101,7 @@
             <a:pPr lvl="1"/>
             <a:r>
               <a:rPr lang="en-US" dirty="0"/>
-              <a:t>You voice and feedback resounds the loudest!</a:t>
+              <a:t>Your voice and feedback resounds the loudest!</a:t>
             </a:r>
           </a:p>
         </p:txBody>
@@ -8313,8 +8423,13 @@
             <a:pPr lvl="1"/>
             <a:r>
               <a:rPr lang="en-US" dirty="0"/>
-              <a:t>Note: Sage 300 2021.1 did not require a Web SDK version </a:t>
-            </a:r>
+              <a:t>Note: Sage 300 2021.1 did not require a Web SDK </a:t>
+            </a:r>
+            <a:r>
+              <a:rPr lang="en-US"/>
+              <a:t>version        </a:t>
+            </a:r>
+            <a:endParaRPr lang="en-US" dirty="0"/>
           </a:p>
         </p:txBody>
       </p:sp>
@@ -9861,7 +9976,7 @@
           <p:nvPr>
             <p:extLst>
               <p:ext uri="{D42A27DB-BD31-4B8C-83A1-F6EECF244321}">
-                <p14:modId xmlns:p14="http://schemas.microsoft.com/office/powerpoint/2010/main" val="3281636690"/>
+                <p14:modId xmlns:p14="http://schemas.microsoft.com/office/powerpoint/2010/main" val="3870007947"/>
               </p:ext>
             </p:extLst>
           </p:nvPr>

</xml_diff>